<commit_message>
doc: fix some urls
</commit_message>
<xml_diff>
--- a/presentations/05-spring-integrations.pptx
+++ b/presentations/05-spring-integrations.pptx
@@ -24197,17 +24197,23 @@
               <a:buNone/>
             </a:pPr>
             <a:r>
-              <a:rPr lang="en-US" sz="1000" dirty="0">
+              <a:rPr lang="en-US" sz="1050" dirty="0">
                 <a:hlinkClick r:id="rId3"/>
               </a:rPr>
               <a:t>https://</a:t>
             </a:r>
             <a:r>
-              <a:rPr lang="en-US" sz="1000" dirty="0" smtClean="0">
+              <a:rPr lang="en-US" sz="1050" dirty="0" smtClean="0">
                 <a:hlinkClick r:id="rId3"/>
               </a:rPr>
-              <a:t>raw.githubusercontent.com/Telefonica/sandas-authorization/master/src/consumers/deleter/src/main/resources/application.yml?token=ABEAXIYZGHGOP3NKHONVVIS44LWRW</a:t>
-            </a:r>
+              <a:t>github.com/Telefonica/cto-spring-webflux-training/blob/master/examples/spring-cloud-stream-kafka/src/main/resources/application.yml</a:t>
+            </a:r>
+            <a:endParaRPr lang="en-US" sz="1050" dirty="0" smtClean="0"/>
+          </a:p>
+          <a:p>
+            <a:pPr marL="342900" lvl="1" indent="0" algn="just">
+              <a:buNone/>
+            </a:pPr>
             <a:endParaRPr lang="en-US" sz="1000" dirty="0"/>
           </a:p>
         </p:txBody>
@@ -25356,7 +25362,7 @@
           <a:bodyPr/>
           <a:lstStyle/>
           <a:p>
-            <a:endParaRPr lang="en-US" dirty="0" smtClean="0"/>
+            <a:endParaRPr lang="en-US" sz="1800" dirty="0" smtClean="0"/>
           </a:p>
           <a:p>
             <a:r>

</xml_diff>